<commit_message>
Update schematic on main page.
</commit_message>
<xml_diff>
--- a/doc/user/schematic.pptx
+++ b/doc/user/schematic.pptx
@@ -107,6 +107,22 @@
       </a:defRPr>
     </a:lvl9pPr>
   </p:defaultTextStyle>
+  <p:extLst>
+    <p:ext uri="{EFAFB233-063F-42B5-8137-9DF3F51BA10A}">
+      <p15:sldGuideLst xmlns:p15="http://schemas.microsoft.com/office/powerpoint/2012/main">
+        <p15:guide id="1" orient="horz" pos="1152">
+          <p15:clr>
+            <a:srgbClr val="A4A3A4"/>
+          </p15:clr>
+        </p15:guide>
+        <p15:guide id="2" pos="3456">
+          <p15:clr>
+            <a:srgbClr val="A4A3A4"/>
+          </p15:clr>
+        </p15:guide>
+      </p15:sldGuideLst>
+    </p:ext>
+  </p:extLst>
 </p:presentation>
 </file>
 
@@ -192,7 +208,7 @@
           <a:p>
             <a:fld id="{B9514DE9-CE6D-7346-B6AB-D6C357691BE8}" type="datetimeFigureOut">
               <a:rPr lang="en-US" smtClean="0"/>
-              <a:t>3/27/14</a:t>
+              <a:t>5/6/2014</a:t>
             </a:fld>
             <a:endParaRPr lang="en-US"/>
           </a:p>
@@ -725,7 +741,7 @@
           <a:p>
             <a:fld id="{C8826383-DF83-DD4D-AFD5-5D0AB3397AB2}" type="datetimeFigureOut">
               <a:rPr lang="en-US" smtClean="0"/>
-              <a:t>3/27/14</a:t>
+              <a:t>5/6/2014</a:t>
             </a:fld>
             <a:endParaRPr lang="en-US"/>
           </a:p>
@@ -895,7 +911,7 @@
           <a:p>
             <a:fld id="{C8826383-DF83-DD4D-AFD5-5D0AB3397AB2}" type="datetimeFigureOut">
               <a:rPr lang="en-US" smtClean="0"/>
-              <a:t>3/27/14</a:t>
+              <a:t>5/6/2014</a:t>
             </a:fld>
             <a:endParaRPr lang="en-US"/>
           </a:p>
@@ -1075,7 +1091,7 @@
           <a:p>
             <a:fld id="{C8826383-DF83-DD4D-AFD5-5D0AB3397AB2}" type="datetimeFigureOut">
               <a:rPr lang="en-US" smtClean="0"/>
-              <a:t>3/27/14</a:t>
+              <a:t>5/6/2014</a:t>
             </a:fld>
             <a:endParaRPr lang="en-US"/>
           </a:p>
@@ -1245,7 +1261,7 @@
           <a:p>
             <a:fld id="{C8826383-DF83-DD4D-AFD5-5D0AB3397AB2}" type="datetimeFigureOut">
               <a:rPr lang="en-US" smtClean="0"/>
-              <a:t>3/27/14</a:t>
+              <a:t>5/6/2014</a:t>
             </a:fld>
             <a:endParaRPr lang="en-US"/>
           </a:p>
@@ -1491,7 +1507,7 @@
           <a:p>
             <a:fld id="{C8826383-DF83-DD4D-AFD5-5D0AB3397AB2}" type="datetimeFigureOut">
               <a:rPr lang="en-US" smtClean="0"/>
-              <a:t>3/27/14</a:t>
+              <a:t>5/6/2014</a:t>
             </a:fld>
             <a:endParaRPr lang="en-US"/>
           </a:p>
@@ -1779,7 +1795,7 @@
           <a:p>
             <a:fld id="{C8826383-DF83-DD4D-AFD5-5D0AB3397AB2}" type="datetimeFigureOut">
               <a:rPr lang="en-US" smtClean="0"/>
-              <a:t>3/27/14</a:t>
+              <a:t>5/6/2014</a:t>
             </a:fld>
             <a:endParaRPr lang="en-US"/>
           </a:p>
@@ -2206,7 +2222,7 @@
           <a:p>
             <a:fld id="{C8826383-DF83-DD4D-AFD5-5D0AB3397AB2}" type="datetimeFigureOut">
               <a:rPr lang="en-US" smtClean="0"/>
-              <a:t>3/27/14</a:t>
+              <a:t>5/6/2014</a:t>
             </a:fld>
             <a:endParaRPr lang="en-US"/>
           </a:p>
@@ -2324,7 +2340,7 @@
           <a:p>
             <a:fld id="{C8826383-DF83-DD4D-AFD5-5D0AB3397AB2}" type="datetimeFigureOut">
               <a:rPr lang="en-US" smtClean="0"/>
-              <a:t>3/27/14</a:t>
+              <a:t>5/6/2014</a:t>
             </a:fld>
             <a:endParaRPr lang="en-US"/>
           </a:p>
@@ -2419,7 +2435,7 @@
           <a:p>
             <a:fld id="{C8826383-DF83-DD4D-AFD5-5D0AB3397AB2}" type="datetimeFigureOut">
               <a:rPr lang="en-US" smtClean="0"/>
-              <a:t>3/27/14</a:t>
+              <a:t>5/6/2014</a:t>
             </a:fld>
             <a:endParaRPr lang="en-US"/>
           </a:p>
@@ -2696,7 +2712,7 @@
           <a:p>
             <a:fld id="{C8826383-DF83-DD4D-AFD5-5D0AB3397AB2}" type="datetimeFigureOut">
               <a:rPr lang="en-US" smtClean="0"/>
-              <a:t>3/27/14</a:t>
+              <a:t>5/6/2014</a:t>
             </a:fld>
             <a:endParaRPr lang="en-US"/>
           </a:p>
@@ -2949,7 +2965,7 @@
           <a:p>
             <a:fld id="{C8826383-DF83-DD4D-AFD5-5D0AB3397AB2}" type="datetimeFigureOut">
               <a:rPr lang="en-US" smtClean="0"/>
-              <a:t>3/27/14</a:t>
+              <a:t>5/6/2014</a:t>
             </a:fld>
             <a:endParaRPr lang="en-US"/>
           </a:p>
@@ -3162,7 +3178,7 @@
           <a:p>
             <a:fld id="{C8826383-DF83-DD4D-AFD5-5D0AB3397AB2}" type="datetimeFigureOut">
               <a:rPr lang="en-US" smtClean="0"/>
-              <a:t>3/27/14</a:t>
+              <a:t>5/6/2014</a:t>
             </a:fld>
             <a:endParaRPr lang="en-US"/>
           </a:p>
@@ -3698,8 +3714,8 @@
         </p:nvSpPr>
         <p:spPr>
           <a:xfrm>
-            <a:off x="161121" y="559251"/>
-            <a:ext cx="1487998" cy="672989"/>
+            <a:off x="74994" y="559251"/>
+            <a:ext cx="1574125" cy="672989"/>
           </a:xfrm>
           <a:prstGeom prst="flowChartMagneticDrum">
             <a:avLst/>
@@ -4663,11 +4679,7 @@
               <a:pPr algn="ctr"/>
               <a:r>
                 <a:rPr lang="en-US" sz="1400" dirty="0" smtClean="0"/>
-                <a:t>search-</a:t>
-              </a:r>
-              <a:r>
-                <a:rPr lang="en-US" sz="1400" dirty="0" smtClean="0"/>
-                <a:t>for-</a:t>
+                <a:t>search-for-</a:t>
               </a:r>
             </a:p>
             <a:p>
@@ -4937,11 +4949,7 @@
               <a:pPr algn="ctr"/>
               <a:r>
                 <a:rPr lang="en-US" sz="1400" dirty="0" smtClean="0"/>
-                <a:t>spectral</a:t>
-              </a:r>
-              <a:r>
-                <a:rPr lang="en-US" sz="1400" dirty="0" smtClean="0"/>
-                <a:t>-</a:t>
+                <a:t>spectral-</a:t>
               </a:r>
             </a:p>
             <a:p>

</xml_diff>

<commit_message>
Fix minor problem with schematic figure.
</commit_message>
<xml_diff>
--- a/doc/user/schematic.pptx
+++ b/doc/user/schematic.pptx
@@ -3954,8 +3954,8 @@
         </p:nvSpPr>
         <p:spPr>
           <a:xfrm>
-            <a:off x="3643046" y="2228243"/>
-            <a:ext cx="1143000" cy="685800"/>
+            <a:off x="3636085" y="2228243"/>
+            <a:ext cx="1149961" cy="685800"/>
           </a:xfrm>
           <a:prstGeom prst="parallelogram">
             <a:avLst/>
@@ -5088,7 +5088,7 @@
           <p:spPr>
             <a:xfrm>
               <a:off x="3341054" y="2570575"/>
-              <a:ext cx="387717" cy="568"/>
+              <a:ext cx="380756" cy="568"/>
             </a:xfrm>
             <a:prstGeom prst="straightConnector1">
               <a:avLst/>

</xml_diff>

<commit_message>
Update web page with new logo.
</commit_message>
<xml_diff>
--- a/doc/user/schematic.pptx
+++ b/doc/user/schematic.pptx
@@ -208,7 +208,7 @@
           <a:p>
             <a:fld id="{B9514DE9-CE6D-7346-B6AB-D6C357691BE8}" type="datetimeFigureOut">
               <a:rPr lang="en-US" smtClean="0"/>
-              <a:t>5/6/2014</a:t>
+              <a:t>5/17/2016</a:t>
             </a:fld>
             <a:endParaRPr lang="en-US"/>
           </a:p>
@@ -741,7 +741,7 @@
           <a:p>
             <a:fld id="{C8826383-DF83-DD4D-AFD5-5D0AB3397AB2}" type="datetimeFigureOut">
               <a:rPr lang="en-US" smtClean="0"/>
-              <a:t>5/6/2014</a:t>
+              <a:t>5/17/2016</a:t>
             </a:fld>
             <a:endParaRPr lang="en-US"/>
           </a:p>
@@ -911,7 +911,7 @@
           <a:p>
             <a:fld id="{C8826383-DF83-DD4D-AFD5-5D0AB3397AB2}" type="datetimeFigureOut">
               <a:rPr lang="en-US" smtClean="0"/>
-              <a:t>5/6/2014</a:t>
+              <a:t>5/17/2016</a:t>
             </a:fld>
             <a:endParaRPr lang="en-US"/>
           </a:p>
@@ -1091,7 +1091,7 @@
           <a:p>
             <a:fld id="{C8826383-DF83-DD4D-AFD5-5D0AB3397AB2}" type="datetimeFigureOut">
               <a:rPr lang="en-US" smtClean="0"/>
-              <a:t>5/6/2014</a:t>
+              <a:t>5/17/2016</a:t>
             </a:fld>
             <a:endParaRPr lang="en-US"/>
           </a:p>
@@ -1261,7 +1261,7 @@
           <a:p>
             <a:fld id="{C8826383-DF83-DD4D-AFD5-5D0AB3397AB2}" type="datetimeFigureOut">
               <a:rPr lang="en-US" smtClean="0"/>
-              <a:t>5/6/2014</a:t>
+              <a:t>5/17/2016</a:t>
             </a:fld>
             <a:endParaRPr lang="en-US"/>
           </a:p>
@@ -1507,7 +1507,7 @@
           <a:p>
             <a:fld id="{C8826383-DF83-DD4D-AFD5-5D0AB3397AB2}" type="datetimeFigureOut">
               <a:rPr lang="en-US" smtClean="0"/>
-              <a:t>5/6/2014</a:t>
+              <a:t>5/17/2016</a:t>
             </a:fld>
             <a:endParaRPr lang="en-US"/>
           </a:p>
@@ -1795,7 +1795,7 @@
           <a:p>
             <a:fld id="{C8826383-DF83-DD4D-AFD5-5D0AB3397AB2}" type="datetimeFigureOut">
               <a:rPr lang="en-US" smtClean="0"/>
-              <a:t>5/6/2014</a:t>
+              <a:t>5/17/2016</a:t>
             </a:fld>
             <a:endParaRPr lang="en-US"/>
           </a:p>
@@ -2222,7 +2222,7 @@
           <a:p>
             <a:fld id="{C8826383-DF83-DD4D-AFD5-5D0AB3397AB2}" type="datetimeFigureOut">
               <a:rPr lang="en-US" smtClean="0"/>
-              <a:t>5/6/2014</a:t>
+              <a:t>5/17/2016</a:t>
             </a:fld>
             <a:endParaRPr lang="en-US"/>
           </a:p>
@@ -2340,7 +2340,7 @@
           <a:p>
             <a:fld id="{C8826383-DF83-DD4D-AFD5-5D0AB3397AB2}" type="datetimeFigureOut">
               <a:rPr lang="en-US" smtClean="0"/>
-              <a:t>5/6/2014</a:t>
+              <a:t>5/17/2016</a:t>
             </a:fld>
             <a:endParaRPr lang="en-US"/>
           </a:p>
@@ -2435,7 +2435,7 @@
           <a:p>
             <a:fld id="{C8826383-DF83-DD4D-AFD5-5D0AB3397AB2}" type="datetimeFigureOut">
               <a:rPr lang="en-US" smtClean="0"/>
-              <a:t>5/6/2014</a:t>
+              <a:t>5/17/2016</a:t>
             </a:fld>
             <a:endParaRPr lang="en-US"/>
           </a:p>
@@ -2712,7 +2712,7 @@
           <a:p>
             <a:fld id="{C8826383-DF83-DD4D-AFD5-5D0AB3397AB2}" type="datetimeFigureOut">
               <a:rPr lang="en-US" smtClean="0"/>
-              <a:t>5/6/2014</a:t>
+              <a:t>5/17/2016</a:t>
             </a:fld>
             <a:endParaRPr lang="en-US"/>
           </a:p>
@@ -2965,7 +2965,7 @@
           <a:p>
             <a:fld id="{C8826383-DF83-DD4D-AFD5-5D0AB3397AB2}" type="datetimeFigureOut">
               <a:rPr lang="en-US" smtClean="0"/>
-              <a:t>5/6/2014</a:t>
+              <a:t>5/17/2016</a:t>
             </a:fld>
             <a:endParaRPr lang="en-US"/>
           </a:p>
@@ -3178,7 +3178,7 @@
           <a:p>
             <a:fld id="{C8826383-DF83-DD4D-AFD5-5D0AB3397AB2}" type="datetimeFigureOut">
               <a:rPr lang="en-US" smtClean="0"/>
-              <a:t>5/6/2014</a:t>
+              <a:t>5/17/2016</a:t>
             </a:fld>
             <a:endParaRPr lang="en-US"/>
           </a:p>
@@ -3579,7 +3579,7 @@
             <a:avLst/>
           </a:prstGeom>
           <a:solidFill>
-            <a:schemeClr val="accent6">
+            <a:schemeClr val="accent1">
               <a:lumMod val="20000"/>
               <a:lumOff val="80000"/>
             </a:schemeClr>
@@ -3631,7 +3631,10 @@
             <a:avLst/>
           </a:prstGeom>
           <a:solidFill>
-            <a:schemeClr val="bg2"/>
+            <a:schemeClr val="accent1">
+              <a:lumMod val="20000"/>
+              <a:lumOff val="80000"/>
+            </a:schemeClr>
           </a:solidFill>
           <a:ln>
             <a:noFill/>
@@ -3676,7 +3679,10 @@
             <a:avLst/>
           </a:prstGeom>
           <a:solidFill>
-            <a:schemeClr val="bg2"/>
+            <a:schemeClr val="accent1">
+              <a:lumMod val="20000"/>
+              <a:lumOff val="80000"/>
+            </a:schemeClr>
           </a:solidFill>
           <a:ln>
             <a:noFill/>
@@ -3721,9 +3727,9 @@
             <a:avLst/>
           </a:prstGeom>
           <a:solidFill>
-            <a:schemeClr val="bg2">
-              <a:lumMod val="75000"/>
-            </a:schemeClr>
+            <a:srgbClr val="58B4DC">
+              <a:alpha val="20000"/>
+            </a:srgbClr>
           </a:solidFill>
           <a:ln>
             <a:solidFill>
@@ -3781,9 +3787,9 @@
             <a:avLst/>
           </a:prstGeom>
           <a:solidFill>
-            <a:schemeClr val="bg2">
-              <a:lumMod val="75000"/>
-            </a:schemeClr>
+            <a:srgbClr val="58B4DC">
+              <a:alpha val="20000"/>
+            </a:srgbClr>
           </a:solidFill>
           <a:ln>
             <a:solidFill>
@@ -3841,9 +3847,9 @@
             <a:avLst/>
           </a:prstGeom>
           <a:solidFill>
-            <a:schemeClr val="bg2">
-              <a:lumMod val="75000"/>
-            </a:schemeClr>
+            <a:srgbClr val="58B4DC">
+              <a:alpha val="20000"/>
+            </a:srgbClr>
           </a:solidFill>
           <a:ln>
             <a:solidFill>
@@ -3901,9 +3907,9 @@
             <a:avLst/>
           </a:prstGeom>
           <a:solidFill>
-            <a:schemeClr val="bg2">
-              <a:lumMod val="75000"/>
-            </a:schemeClr>
+            <a:srgbClr val="58B4DC">
+              <a:alpha val="20000"/>
+            </a:srgbClr>
           </a:solidFill>
           <a:ln>
             <a:solidFill>
@@ -3961,9 +3967,9 @@
             <a:avLst/>
           </a:prstGeom>
           <a:solidFill>
-            <a:schemeClr val="bg2">
-              <a:lumMod val="75000"/>
-            </a:schemeClr>
+            <a:srgbClr val="58B4DC">
+              <a:alpha val="20000"/>
+            </a:srgbClr>
           </a:solidFill>
           <a:ln>
             <a:solidFill>
@@ -4032,9 +4038,9 @@
             <a:avLst/>
           </a:prstGeom>
           <a:solidFill>
-            <a:schemeClr val="bg2">
-              <a:lumMod val="75000"/>
-            </a:schemeClr>
+            <a:srgbClr val="58B4DC">
+              <a:alpha val="20000"/>
+            </a:srgbClr>
           </a:solidFill>
           <a:ln>
             <a:solidFill>
@@ -4092,9 +4098,9 @@
             <a:avLst/>
           </a:prstGeom>
           <a:solidFill>
-            <a:schemeClr val="bg2">
-              <a:lumMod val="75000"/>
-            </a:schemeClr>
+            <a:srgbClr val="58B4DC">
+              <a:alpha val="20000"/>
+            </a:srgbClr>
           </a:solidFill>
           <a:ln>
             <a:solidFill>
@@ -4152,9 +4158,9 @@
             <a:avLst/>
           </a:prstGeom>
           <a:solidFill>
-            <a:schemeClr val="bg2">
-              <a:lumMod val="75000"/>
-            </a:schemeClr>
+            <a:srgbClr val="58B4DC">
+              <a:alpha val="20000"/>
+            </a:srgbClr>
           </a:solidFill>
           <a:ln>
             <a:solidFill>
@@ -4212,9 +4218,9 @@
             <a:avLst/>
           </a:prstGeom>
           <a:solidFill>
-            <a:schemeClr val="bg2">
-              <a:lumMod val="75000"/>
-            </a:schemeClr>
+            <a:srgbClr val="58B4DC">
+              <a:alpha val="20000"/>
+            </a:srgbClr>
           </a:solidFill>
           <a:ln>
             <a:solidFill>
@@ -4272,9 +4278,9 @@
             <a:avLst/>
           </a:prstGeom>
           <a:solidFill>
-            <a:schemeClr val="bg2">
-              <a:lumMod val="75000"/>
-            </a:schemeClr>
+            <a:srgbClr val="58B4DC">
+              <a:alpha val="20000"/>
+            </a:srgbClr>
           </a:solidFill>
           <a:ln>
             <a:solidFill>
@@ -4346,14 +4352,11 @@
               <a:avLst/>
             </a:prstGeom>
             <a:solidFill>
-              <a:schemeClr val="accent3">
-                <a:lumMod val="60000"/>
-                <a:lumOff val="40000"/>
-              </a:schemeClr>
+              <a:srgbClr val="58B4DC"/>
             </a:solidFill>
             <a:ln>
               <a:solidFill>
-                <a:schemeClr val="accent3"/>
+                <a:srgbClr val="0070C0"/>
               </a:solidFill>
             </a:ln>
           </p:spPr>
@@ -4524,14 +4527,11 @@
               <a:avLst/>
             </a:prstGeom>
             <a:solidFill>
-              <a:schemeClr val="accent3">
-                <a:lumMod val="60000"/>
-                <a:lumOff val="40000"/>
-              </a:schemeClr>
+              <a:srgbClr val="58B4DC"/>
             </a:solidFill>
             <a:ln>
               <a:solidFill>
-                <a:schemeClr val="accent3"/>
+                <a:srgbClr val="0070C0"/>
               </a:solidFill>
             </a:ln>
           </p:spPr>
@@ -4752,14 +4752,11 @@
               <a:avLst/>
             </a:prstGeom>
             <a:solidFill>
-              <a:schemeClr val="accent3">
-                <a:lumMod val="60000"/>
-                <a:lumOff val="40000"/>
-              </a:schemeClr>
+              <a:srgbClr val="58B4DC"/>
             </a:solidFill>
             <a:ln>
               <a:solidFill>
-                <a:schemeClr val="accent3"/>
+                <a:srgbClr val="0070C0"/>
               </a:solidFill>
             </a:ln>
           </p:spPr>
@@ -4993,36 +4990,6 @@
           </p:txBody>
         </p:sp>
       </p:grpSp>
-      <p:sp>
-        <p:nvSpPr>
-          <p:cNvPr id="30" name="TextBox 29"/>
-          <p:cNvSpPr txBox="1"/>
-          <p:nvPr/>
-        </p:nvSpPr>
-        <p:spPr>
-          <a:xfrm>
-            <a:off x="3459329" y="9476"/>
-            <a:ext cx="3996557" cy="369332"/>
-          </a:xfrm>
-          <a:prstGeom prst="rect">
-            <a:avLst/>
-          </a:prstGeom>
-          <a:noFill/>
-        </p:spPr>
-        <p:txBody>
-          <a:bodyPr wrap="none" rtlCol="0">
-            <a:spAutoFit/>
-          </a:bodyPr>
-          <a:lstStyle/>
-          <a:p>
-            <a:r>
-              <a:rPr lang="en-US" dirty="0" smtClean="0"/>
-              <a:t>Crux Tandem Mass Spectrometry Toolkit</a:t>
-            </a:r>
-            <a:endParaRPr lang="en-US" dirty="0"/>
-          </a:p>
-        </p:txBody>
-      </p:sp>
       <p:grpSp>
         <p:nvGrpSpPr>
           <p:cNvPr id="117" name="Group 116"/>

</xml_diff>